<commit_message>
small update to semantics
</commit_message>
<xml_diff>
--- a/C4-Semantics.pptx
+++ b/C4-Semantics.pptx
@@ -222,7 +222,7 @@
           <a:p>
             <a:fld id="{3BA3126A-9D2D-4B4A-8971-6014467F0872}" type="datetimeFigureOut">
               <a:rPr lang="en-US" smtClean="0"/>
-              <a:t>3/22/20</a:t>
+              <a:t>11/2/20</a:t>
             </a:fld>
             <a:endParaRPr lang="en-US"/>
           </a:p>
@@ -636,7 +636,7 @@
           <a:p>
             <a:fld id="{C4F7C10F-CACD-BC45-8FD3-842F0A9255EB}" type="datetime1">
               <a:rPr lang="en-US" smtClean="0"/>
-              <a:t>3/22/20</a:t>
+              <a:t>11/2/20</a:t>
             </a:fld>
             <a:endParaRPr lang="en-US"/>
           </a:p>
@@ -837,7 +837,7 @@
           <a:p>
             <a:fld id="{A7BE4BC0-3459-794A-A887-5632D7972A29}" type="datetime1">
               <a:rPr lang="en-US" smtClean="0"/>
-              <a:t>3/22/20</a:t>
+              <a:t>11/2/20</a:t>
             </a:fld>
             <a:endParaRPr lang="en-US"/>
           </a:p>
@@ -1048,7 +1048,7 @@
           <a:p>
             <a:fld id="{F742135D-B5DA-B74E-9E36-B446429B5DB2}" type="datetime1">
               <a:rPr lang="en-US" smtClean="0"/>
-              <a:t>3/22/20</a:t>
+              <a:t>11/2/20</a:t>
             </a:fld>
             <a:endParaRPr lang="en-US"/>
           </a:p>
@@ -1249,7 +1249,7 @@
           <a:p>
             <a:fld id="{1FB2F660-2A7E-4449-BC16-F03A8E8D72C1}" type="datetime1">
               <a:rPr lang="en-US" smtClean="0"/>
-              <a:t>3/22/20</a:t>
+              <a:t>11/2/20</a:t>
             </a:fld>
             <a:endParaRPr lang="en-US"/>
           </a:p>
@@ -1527,7 +1527,7 @@
           <a:p>
             <a:fld id="{ACF5311F-5D17-A644-902C-CD53A0E9F565}" type="datetime1">
               <a:rPr lang="en-US" smtClean="0"/>
-              <a:t>3/22/20</a:t>
+              <a:t>11/2/20</a:t>
             </a:fld>
             <a:endParaRPr lang="en-US"/>
           </a:p>
@@ -1795,7 +1795,7 @@
           <a:p>
             <a:fld id="{7323B60B-C76F-BD4F-8ED7-3A39496A150B}" type="datetime1">
               <a:rPr lang="en-US" smtClean="0"/>
-              <a:t>3/22/20</a:t>
+              <a:t>11/2/20</a:t>
             </a:fld>
             <a:endParaRPr lang="en-US"/>
           </a:p>
@@ -2210,7 +2210,7 @@
           <a:p>
             <a:fld id="{F8B69401-E09A-CA4A-9619-995AEA6D3123}" type="datetime1">
               <a:rPr lang="en-US" smtClean="0"/>
-              <a:t>3/22/20</a:t>
+              <a:t>11/2/20</a:t>
             </a:fld>
             <a:endParaRPr lang="en-US"/>
           </a:p>
@@ -2354,7 +2354,7 @@
           <a:p>
             <a:fld id="{C920AE4A-2A10-8245-9029-D816474677FF}" type="datetime1">
               <a:rPr lang="en-US" smtClean="0"/>
-              <a:t>3/22/20</a:t>
+              <a:t>11/2/20</a:t>
             </a:fld>
             <a:endParaRPr lang="en-US"/>
           </a:p>
@@ -2470,7 +2470,7 @@
           <a:p>
             <a:fld id="{CC287C52-3C16-584A-BA20-2441D6FBEB8D}" type="datetime1">
               <a:rPr lang="en-US" smtClean="0"/>
-              <a:t>3/22/20</a:t>
+              <a:t>11/2/20</a:t>
             </a:fld>
             <a:endParaRPr lang="en-US"/>
           </a:p>
@@ -2784,7 +2784,7 @@
           <a:p>
             <a:fld id="{DC303B03-4E07-294B-BDDF-858305A25AD4}" type="datetime1">
               <a:rPr lang="en-US" smtClean="0"/>
-              <a:t>3/22/20</a:t>
+              <a:t>11/2/20</a:t>
             </a:fld>
             <a:endParaRPr lang="en-US"/>
           </a:p>
@@ -3075,7 +3075,7 @@
           <a:p>
             <a:fld id="{45E61559-019B-DD48-A4E2-FED50C364E64}" type="datetime1">
               <a:rPr lang="en-US" smtClean="0"/>
-              <a:t>3/22/20</a:t>
+              <a:t>11/2/20</a:t>
             </a:fld>
             <a:endParaRPr lang="en-US"/>
           </a:p>
@@ -3319,7 +3319,7 @@
           <a:p>
             <a:fld id="{3C828E5F-98EF-2549-B0A3-7D36CD8789F5}" type="datetime1">
               <a:rPr lang="en-US" smtClean="0"/>
-              <a:t>3/22/20</a:t>
+              <a:t>11/2/20</a:t>
             </a:fld>
             <a:endParaRPr lang="en-US"/>
           </a:p>
@@ -19713,7 +19713,7 @@
         <p:spPr/>
         <p:txBody>
           <a:bodyPr>
-            <a:normAutofit/>
+            <a:normAutofit lnSpcReduction="10000"/>
           </a:bodyPr>
           <a:lstStyle/>
           <a:p>
@@ -19761,14 +19761,146 @@
             <a:pPr lvl="1"/>
             <a:r>
               <a:rPr lang="en-US" dirty="0"/>
-              <a:t>Static rules: add code for checking, array bounds checking</a:t>
+              <a:t>Static rules: add code for checking (e.g. “</a:t>
+            </a:r>
+            <a:r>
+              <a:rPr lang="en-US" dirty="0">
+                <a:solidFill>
+                  <a:srgbClr val="FF0000"/>
+                </a:solidFill>
+              </a:rPr>
+              <a:t>sum / 0</a:t>
+            </a:r>
+            <a:r>
+              <a:rPr lang="en-US" dirty="0"/>
+              <a:t>”), array bounds checking (e.g. ”</a:t>
+            </a:r>
+            <a:r>
+              <a:rPr lang="en-US" dirty="0">
+                <a:solidFill>
+                  <a:srgbClr val="0070C0"/>
+                </a:solidFill>
+              </a:rPr>
+              <a:t>int a[10]; for (</a:t>
+            </a:r>
+            <a:r>
+              <a:rPr lang="en-US" dirty="0" err="1">
+                <a:solidFill>
+                  <a:srgbClr val="0070C0"/>
+                </a:solidFill>
+              </a:rPr>
+              <a:t>i</a:t>
+            </a:r>
+            <a:r>
+              <a:rPr lang="en-US" dirty="0">
+                <a:solidFill>
+                  <a:srgbClr val="0070C0"/>
+                </a:solidFill>
+              </a:rPr>
+              <a:t>=0; </a:t>
+            </a:r>
+            <a:r>
+              <a:rPr lang="en-US" dirty="0" err="1">
+                <a:solidFill>
+                  <a:srgbClr val="FF0000"/>
+                </a:solidFill>
+              </a:rPr>
+              <a:t>i</a:t>
+            </a:r>
+            <a:r>
+              <a:rPr lang="en-US" dirty="0">
+                <a:solidFill>
+                  <a:srgbClr val="FF0000"/>
+                </a:solidFill>
+              </a:rPr>
+              <a:t>&lt;=10</a:t>
+            </a:r>
+            <a:r>
+              <a:rPr lang="en-US" dirty="0">
+                <a:solidFill>
+                  <a:srgbClr val="0070C0"/>
+                </a:solidFill>
+              </a:rPr>
+              <a:t>; </a:t>
+            </a:r>
+            <a:r>
+              <a:rPr lang="en-US" dirty="0" err="1">
+                <a:solidFill>
+                  <a:srgbClr val="0070C0"/>
+                </a:solidFill>
+              </a:rPr>
+              <a:t>i</a:t>
+            </a:r>
+            <a:r>
+              <a:rPr lang="en-US" dirty="0">
+                <a:solidFill>
+                  <a:srgbClr val="0070C0"/>
+                </a:solidFill>
+              </a:rPr>
+              <a:t>++) a[</a:t>
+            </a:r>
+            <a:r>
+              <a:rPr lang="en-US" dirty="0" err="1">
+                <a:solidFill>
+                  <a:srgbClr val="FF0000"/>
+                </a:solidFill>
+              </a:rPr>
+              <a:t>i</a:t>
+            </a:r>
+            <a:r>
+              <a:rPr lang="en-US" dirty="0">
+                <a:solidFill>
+                  <a:srgbClr val="0070C0"/>
+                </a:solidFill>
+              </a:rPr>
+              <a:t>] = </a:t>
+            </a:r>
+            <a:r>
+              <a:rPr lang="en-US" dirty="0" err="1">
+                <a:solidFill>
+                  <a:srgbClr val="0070C0"/>
+                </a:solidFill>
+              </a:rPr>
+              <a:t>i</a:t>
+            </a:r>
+            <a:r>
+              <a:rPr lang="en-US" dirty="0">
+                <a:solidFill>
+                  <a:srgbClr val="0070C0"/>
+                </a:solidFill>
+              </a:rPr>
+              <a:t>;”)</a:t>
             </a:r>
           </a:p>
           <a:p>
             <a:pPr lvl="1"/>
             <a:r>
               <a:rPr lang="en-US" dirty="0"/>
-              <a:t>Dynamic rules:  a division by zero, accessing valid array positions</a:t>
+              <a:t>Dynamic rules:  a division by zero (e.g. “</a:t>
+            </a:r>
+            <a:r>
+              <a:rPr lang="en-US" dirty="0">
+                <a:solidFill>
+                  <a:srgbClr val="FF0000"/>
+                </a:solidFill>
+              </a:rPr>
+              <a:t>sum / n</a:t>
+            </a:r>
+            <a:r>
+              <a:rPr lang="en-US" dirty="0"/>
+              <a:t>”), accessing valid array positions (e.g. “</a:t>
+            </a:r>
+            <a:r>
+              <a:rPr lang="en-US" dirty="0">
+                <a:solidFill>
+                  <a:srgbClr val="FF0000"/>
+                </a:solidFill>
+              </a:rPr>
+              <a:t>int a[10]; … a[15]; </a:t>
+            </a:r>
+            <a:r>
+              <a:rPr lang="en-US" dirty="0"/>
+              <a:t>“)</a:t>
             </a:r>
           </a:p>
           <a:p>
@@ -21659,7 +21791,35 @@
             </a:pPr>
             <a:r>
               <a:rPr lang="en-US" sz="2400" dirty="0"/>
-              <a:t>Example: pointer analysis attempts to find when are pointers safe, being used, not being used, initialized, </a:t>
+              <a:t>Example: pointer analysis (e.g. “</a:t>
+            </a:r>
+            <a:r>
+              <a:rPr lang="en-US" sz="2400" dirty="0">
+                <a:solidFill>
+                  <a:srgbClr val="FF0000"/>
+                </a:solidFill>
+              </a:rPr>
+              <a:t>char * </a:t>
+            </a:r>
+            <a:r>
+              <a:rPr lang="en-US" sz="2400" dirty="0" err="1">
+                <a:solidFill>
+                  <a:srgbClr val="FF0000"/>
+                </a:solidFill>
+              </a:rPr>
+              <a:t>ptr</a:t>
+            </a:r>
+            <a:r>
+              <a:rPr lang="en-US" sz="2400" dirty="0">
+                <a:solidFill>
+                  <a:srgbClr val="FF0000"/>
+                </a:solidFill>
+              </a:rPr>
+              <a:t>”</a:t>
+            </a:r>
+            <a:r>
+              <a:rPr lang="en-US" sz="2400" dirty="0"/>
+              <a:t>) attempts to find when are pointers safe, being used, not being used, initialized, </a:t>
             </a:r>
             <a:r>
               <a:rPr lang="en-US" sz="2400" dirty="0" err="1"/>

</xml_diff>